<commit_message>
Replace the template slide (yellow on blue instead). Also, just remove slides from the template within the servlet startup instead of by hand -- it is too troublesome.
</commit_message>
<xml_diff>
--- a/src/main/webapp/WEB-INF/template.pptx
+++ b/src/main/webapp/WEB-INF/template.pptx
@@ -7,7 +7,9 @@
   <p:notesMasterIdLst>
     <p:notesMasterId r:id="rId4"/>
   </p:notesMasterIdLst>
-  <p:sldIdLst/>
+  <p:sldIdLst>
+    <p:sldId id="256" r:id="rId5"/>
+  </p:sldIdLst>
   <p:sldSz cy="6858000" cx="9144000"/>
   <p:notesSz cx="6858000" cy="9144000"/>
   <p:embeddedFontLst>
@@ -22,7 +24,7 @@
     </p:embeddedFont>
   </p:embeddedFontLst>
   <p:defaultTextStyle>
-    <a:defPPr marR="0" rtl="0" algn="l">
+    <a:defPPr lvl="0" marR="0" rtl="0" algn="l">
       <a:lnSpc>
         <a:spcPct val="100000"/>
       </a:lnSpc>
@@ -33,7 +35,7 @@
         <a:spcPts val="0"/>
       </a:spcAft>
     </a:defPPr>
-    <a:lvl1pPr marR="0" rtl="0" algn="l">
+    <a:lvl1pPr lvl="0" marR="0" rtl="0" algn="l">
       <a:lnSpc>
         <a:spcPct val="100000"/>
       </a:lnSpc>
@@ -44,7 +46,7 @@
         <a:spcPts val="0"/>
       </a:spcAft>
       <a:buNone/>
-      <a:defRPr b="0" baseline="0" i="0" sz="1400" u="none" cap="none" strike="noStrike">
+      <a:defRPr b="0" i="0" sz="1400" u="none" cap="none" strike="noStrike">
         <a:solidFill>
           <a:srgbClr val="000000"/>
         </a:solidFill>
@@ -55,7 +57,7 @@
         <a:rtl val="0"/>
       </a:defRPr>
     </a:lvl1pPr>
-    <a:lvl2pPr marR="0" rtl="0" algn="l">
+    <a:lvl2pPr lvl="1" marR="0" rtl="0" algn="l">
       <a:lnSpc>
         <a:spcPct val="100000"/>
       </a:lnSpc>
@@ -66,7 +68,7 @@
         <a:spcPts val="0"/>
       </a:spcAft>
       <a:buNone/>
-      <a:defRPr b="0" baseline="0" i="0" sz="1400" u="none" cap="none" strike="noStrike">
+      <a:defRPr b="0" i="0" sz="1400" u="none" cap="none" strike="noStrike">
         <a:solidFill>
           <a:srgbClr val="000000"/>
         </a:solidFill>
@@ -77,7 +79,7 @@
         <a:rtl val="0"/>
       </a:defRPr>
     </a:lvl2pPr>
-    <a:lvl3pPr marR="0" rtl="0" algn="l">
+    <a:lvl3pPr lvl="2" marR="0" rtl="0" algn="l">
       <a:lnSpc>
         <a:spcPct val="100000"/>
       </a:lnSpc>
@@ -88,7 +90,7 @@
         <a:spcPts val="0"/>
       </a:spcAft>
       <a:buNone/>
-      <a:defRPr b="0" baseline="0" i="0" sz="1400" u="none" cap="none" strike="noStrike">
+      <a:defRPr b="0" i="0" sz="1400" u="none" cap="none" strike="noStrike">
         <a:solidFill>
           <a:srgbClr val="000000"/>
         </a:solidFill>
@@ -99,7 +101,7 @@
         <a:rtl val="0"/>
       </a:defRPr>
     </a:lvl3pPr>
-    <a:lvl4pPr marR="0" rtl="0" algn="l">
+    <a:lvl4pPr lvl="3" marR="0" rtl="0" algn="l">
       <a:lnSpc>
         <a:spcPct val="100000"/>
       </a:lnSpc>
@@ -110,7 +112,7 @@
         <a:spcPts val="0"/>
       </a:spcAft>
       <a:buNone/>
-      <a:defRPr b="0" baseline="0" i="0" sz="1400" u="none" cap="none" strike="noStrike">
+      <a:defRPr b="0" i="0" sz="1400" u="none" cap="none" strike="noStrike">
         <a:solidFill>
           <a:srgbClr val="000000"/>
         </a:solidFill>
@@ -121,7 +123,7 @@
         <a:rtl val="0"/>
       </a:defRPr>
     </a:lvl4pPr>
-    <a:lvl5pPr marR="0" rtl="0" algn="l">
+    <a:lvl5pPr lvl="4" marR="0" rtl="0" algn="l">
       <a:lnSpc>
         <a:spcPct val="100000"/>
       </a:lnSpc>
@@ -132,7 +134,7 @@
         <a:spcPts val="0"/>
       </a:spcAft>
       <a:buNone/>
-      <a:defRPr b="0" baseline="0" i="0" sz="1400" u="none" cap="none" strike="noStrike">
+      <a:defRPr b="0" i="0" sz="1400" u="none" cap="none" strike="noStrike">
         <a:solidFill>
           <a:srgbClr val="000000"/>
         </a:solidFill>
@@ -143,7 +145,7 @@
         <a:rtl val="0"/>
       </a:defRPr>
     </a:lvl5pPr>
-    <a:lvl6pPr marR="0" rtl="0" algn="l">
+    <a:lvl6pPr lvl="5" marR="0" rtl="0" algn="l">
       <a:lnSpc>
         <a:spcPct val="100000"/>
       </a:lnSpc>
@@ -154,7 +156,7 @@
         <a:spcPts val="0"/>
       </a:spcAft>
       <a:buNone/>
-      <a:defRPr b="0" baseline="0" i="0" sz="1400" u="none" cap="none" strike="noStrike">
+      <a:defRPr b="0" i="0" sz="1400" u="none" cap="none" strike="noStrike">
         <a:solidFill>
           <a:srgbClr val="000000"/>
         </a:solidFill>
@@ -165,7 +167,7 @@
         <a:rtl val="0"/>
       </a:defRPr>
     </a:lvl6pPr>
-    <a:lvl7pPr marR="0" rtl="0" algn="l">
+    <a:lvl7pPr lvl="6" marR="0" rtl="0" algn="l">
       <a:lnSpc>
         <a:spcPct val="100000"/>
       </a:lnSpc>
@@ -176,7 +178,7 @@
         <a:spcPts val="0"/>
       </a:spcAft>
       <a:buNone/>
-      <a:defRPr b="0" baseline="0" i="0" sz="1400" u="none" cap="none" strike="noStrike">
+      <a:defRPr b="0" i="0" sz="1400" u="none" cap="none" strike="noStrike">
         <a:solidFill>
           <a:srgbClr val="000000"/>
         </a:solidFill>
@@ -187,7 +189,7 @@
         <a:rtl val="0"/>
       </a:defRPr>
     </a:lvl7pPr>
-    <a:lvl8pPr marR="0" rtl="0" algn="l">
+    <a:lvl8pPr lvl="7" marR="0" rtl="0" algn="l">
       <a:lnSpc>
         <a:spcPct val="100000"/>
       </a:lnSpc>
@@ -198,7 +200,7 @@
         <a:spcPts val="0"/>
       </a:spcAft>
       <a:buNone/>
-      <a:defRPr b="0" baseline="0" i="0" sz="1400" u="none" cap="none" strike="noStrike">
+      <a:defRPr b="0" i="0" sz="1400" u="none" cap="none" strike="noStrike">
         <a:solidFill>
           <a:srgbClr val="000000"/>
         </a:solidFill>
@@ -209,7 +211,7 @@
         <a:rtl val="0"/>
       </a:defRPr>
     </a:lvl8pPr>
-    <a:lvl9pPr marR="0" rtl="0" algn="l">
+    <a:lvl9pPr lvl="8" marR="0" rtl="0" algn="l">
       <a:lnSpc>
         <a:spcPct val="100000"/>
       </a:lnSpc>
@@ -220,7 +222,7 @@
         <a:spcPts val="0"/>
       </a:spcAft>
       <a:buNone/>
-      <a:defRPr b="0" baseline="0" i="0" sz="1400" u="none" cap="none" strike="noStrike">
+      <a:defRPr b="0" i="0" sz="1400" u="none" cap="none" strike="noStrike">
         <a:solidFill>
           <a:srgbClr val="000000"/>
         </a:solidFill>
@@ -240,7 +242,7 @@
   <p:cSld>
     <p:spTree>
       <p:nvGrpSpPr>
-        <p:cNvPr id="1" name="Shape 1"/>
+        <p:cNvPr id="2" name="Shape 2"/>
         <p:cNvGrpSpPr/>
         <p:nvPr/>
       </p:nvGrpSpPr>
@@ -254,7 +256,7 @@
       </p:grpSpPr>
       <p:sp>
         <p:nvSpPr>
-          <p:cNvPr id="2" name="Shape 2"/>
+          <p:cNvPr id="3" name="Shape 3"/>
           <p:cNvSpPr/>
           <p:nvPr>
             <p:ph idx="2" type="sldImg"/>
@@ -298,7 +300,7 @@
       </p:sp>
       <p:sp>
         <p:nvSpPr>
-          <p:cNvPr id="3" name="Shape 3"/>
+          <p:cNvPr id="4" name="Shape 4"/>
           <p:cNvSpPr txBox="1"/>
           <p:nvPr>
             <p:ph idx="1" type="body"/>
@@ -320,55 +322,55 @@
         <p:txBody>
           <a:bodyPr anchorCtr="0" anchor="t" bIns="91425" lIns="91425" rIns="91425" tIns="91425"/>
           <a:lstStyle>
-            <a:lvl1pPr>
+            <a:lvl1pPr lvl="0">
               <a:spcBef>
                 <a:spcPts val="0"/>
               </a:spcBef>
               <a:defRPr sz="1100"/>
             </a:lvl1pPr>
-            <a:lvl2pPr>
+            <a:lvl2pPr lvl="1">
               <a:spcBef>
                 <a:spcPts val="0"/>
               </a:spcBef>
               <a:defRPr sz="1100"/>
             </a:lvl2pPr>
-            <a:lvl3pPr>
+            <a:lvl3pPr lvl="2">
               <a:spcBef>
                 <a:spcPts val="0"/>
               </a:spcBef>
               <a:defRPr sz="1100"/>
             </a:lvl3pPr>
-            <a:lvl4pPr>
+            <a:lvl4pPr lvl="3">
               <a:spcBef>
                 <a:spcPts val="0"/>
               </a:spcBef>
               <a:defRPr sz="1100"/>
             </a:lvl4pPr>
-            <a:lvl5pPr>
+            <a:lvl5pPr lvl="4">
               <a:spcBef>
                 <a:spcPts val="0"/>
               </a:spcBef>
               <a:defRPr sz="1100"/>
             </a:lvl5pPr>
-            <a:lvl6pPr>
+            <a:lvl6pPr lvl="5">
               <a:spcBef>
                 <a:spcPts val="0"/>
               </a:spcBef>
               <a:defRPr sz="1100"/>
             </a:lvl6pPr>
-            <a:lvl7pPr>
+            <a:lvl7pPr lvl="6">
               <a:spcBef>
                 <a:spcPts val="0"/>
               </a:spcBef>
               <a:defRPr sz="1100"/>
             </a:lvl7pPr>
-            <a:lvl8pPr>
+            <a:lvl8pPr lvl="7">
               <a:spcBef>
                 <a:spcPts val="0"/>
               </a:spcBef>
               <a:defRPr sz="1100"/>
             </a:lvl8pPr>
-            <a:lvl9pPr>
+            <a:lvl9pPr lvl="8">
               <a:spcBef>
                 <a:spcPts val="0"/>
               </a:spcBef>
@@ -389,7 +391,7 @@
   <p:cSld>
     <p:spTree>
       <p:nvGrpSpPr>
-        <p:cNvPr id="22" name="Shape 22"/>
+        <p:cNvPr id="23" name="Shape 23"/>
         <p:cNvGrpSpPr/>
         <p:nvPr/>
       </p:nvGrpSpPr>
@@ -403,7 +405,7 @@
       </p:grpSpPr>
       <p:sp>
         <p:nvSpPr>
-          <p:cNvPr id="23" name="Shape 23"/>
+          <p:cNvPr id="24" name="Shape 24"/>
           <p:cNvSpPr/>
           <p:nvPr>
             <p:ph idx="2" type="sldImg"/>
@@ -447,7 +449,7 @@
       </p:sp>
       <p:sp>
         <p:nvSpPr>
-          <p:cNvPr id="24" name="Shape 24"/>
+          <p:cNvPr id="25" name="Shape 25"/>
           <p:cNvSpPr txBox="1"/>
           <p:nvPr>
             <p:ph idx="1" type="body"/>
@@ -468,7 +470,7 @@
           </a:bodyPr>
           <a:lstStyle/>
           <a:p>
-            <a:pPr>
+            <a:pPr lvl="0">
               <a:spcBef>
                 <a:spcPts val="0"/>
               </a:spcBef>
@@ -494,7 +496,7 @@
   <p:cSld name="Title slide">
     <p:spTree>
       <p:nvGrpSpPr>
-        <p:cNvPr id="8" name="Shape 8"/>
+        <p:cNvPr id="9" name="Shape 9"/>
         <p:cNvGrpSpPr/>
         <p:nvPr/>
       </p:nvGrpSpPr>
@@ -508,7 +510,7 @@
       </p:grpSpPr>
       <p:grpSp>
         <p:nvGrpSpPr>
-          <p:cNvPr id="9" name="Shape 9"/>
+          <p:cNvPr id="10" name="Shape 10"/>
           <p:cNvGrpSpPr/>
           <p:nvPr/>
         </p:nvGrpSpPr>
@@ -522,7 +524,7 @@
         </p:grpSpPr>
         <p:sp>
           <p:nvSpPr>
-            <p:cNvPr id="10" name="Shape 10"/>
+            <p:cNvPr id="11" name="Shape 11"/>
             <p:cNvSpPr/>
             <p:nvPr/>
           </p:nvSpPr>
@@ -547,7 +549,7 @@
             </a:bodyPr>
             <a:lstStyle/>
             <a:p>
-              <a:pPr>
+              <a:pPr lvl="0">
                 <a:spcBef>
                   <a:spcPts val="0"/>
                 </a:spcBef>
@@ -562,7 +564,7 @@
         </p:sp>
         <p:sp>
           <p:nvSpPr>
-            <p:cNvPr id="11" name="Shape 11"/>
+            <p:cNvPr id="12" name="Shape 12"/>
             <p:cNvSpPr/>
             <p:nvPr/>
           </p:nvSpPr>
@@ -587,7 +589,7 @@
             </a:bodyPr>
             <a:lstStyle/>
             <a:p>
-              <a:pPr>
+              <a:pPr lvl="0">
                 <a:spcBef>
                   <a:spcPts val="0"/>
                 </a:spcBef>
@@ -602,7 +604,7 @@
         </p:sp>
         <p:sp>
           <p:nvSpPr>
-            <p:cNvPr id="12" name="Shape 12"/>
+            <p:cNvPr id="13" name="Shape 13"/>
             <p:cNvSpPr/>
             <p:nvPr/>
           </p:nvSpPr>
@@ -627,7 +629,7 @@
             </a:bodyPr>
             <a:lstStyle/>
             <a:p>
-              <a:pPr>
+              <a:pPr lvl="0">
                 <a:spcBef>
                   <a:spcPts val="0"/>
                 </a:spcBef>
@@ -643,7 +645,7 @@
       </p:grpSp>
       <p:sp>
         <p:nvSpPr>
-          <p:cNvPr id="13" name="Shape 13"/>
+          <p:cNvPr id="14" name="Shape 14"/>
           <p:cNvSpPr txBox="1"/>
           <p:nvPr>
             <p:ph type="ctrTitle"/>
@@ -661,63 +663,63 @@
         <p:txBody>
           <a:bodyPr anchorCtr="0" anchor="b" bIns="91425" lIns="91425" rIns="91425" tIns="91425"/>
           <a:lstStyle>
-            <a:lvl1pPr algn="ctr">
+            <a:lvl1pPr lvl="0" algn="ctr">
               <a:spcBef>
                 <a:spcPts val="0"/>
               </a:spcBef>
               <a:buSzPct val="100000"/>
               <a:defRPr sz="4800"/>
             </a:lvl1pPr>
-            <a:lvl2pPr algn="ctr">
+            <a:lvl2pPr lvl="1" algn="ctr">
               <a:spcBef>
                 <a:spcPts val="0"/>
               </a:spcBef>
               <a:buSzPct val="100000"/>
               <a:defRPr sz="4800"/>
             </a:lvl2pPr>
-            <a:lvl3pPr algn="ctr">
+            <a:lvl3pPr lvl="2" algn="ctr">
               <a:spcBef>
                 <a:spcPts val="0"/>
               </a:spcBef>
               <a:buSzPct val="100000"/>
               <a:defRPr sz="4800"/>
             </a:lvl3pPr>
-            <a:lvl4pPr algn="ctr">
+            <a:lvl4pPr lvl="3" algn="ctr">
               <a:spcBef>
                 <a:spcPts val="0"/>
               </a:spcBef>
               <a:buSzPct val="100000"/>
               <a:defRPr sz="4800"/>
             </a:lvl4pPr>
-            <a:lvl5pPr algn="ctr">
+            <a:lvl5pPr lvl="4" algn="ctr">
               <a:spcBef>
                 <a:spcPts val="0"/>
               </a:spcBef>
               <a:buSzPct val="100000"/>
               <a:defRPr sz="4800"/>
             </a:lvl5pPr>
-            <a:lvl6pPr algn="ctr">
+            <a:lvl6pPr lvl="5" algn="ctr">
               <a:spcBef>
                 <a:spcPts val="0"/>
               </a:spcBef>
               <a:buSzPct val="100000"/>
               <a:defRPr sz="4800"/>
             </a:lvl6pPr>
-            <a:lvl7pPr algn="ctr">
+            <a:lvl7pPr lvl="6" algn="ctr">
               <a:spcBef>
                 <a:spcPts val="0"/>
               </a:spcBef>
               <a:buSzPct val="100000"/>
               <a:defRPr sz="4800"/>
             </a:lvl7pPr>
-            <a:lvl8pPr algn="ctr">
+            <a:lvl8pPr lvl="7" algn="ctr">
               <a:spcBef>
                 <a:spcPts val="0"/>
               </a:spcBef>
               <a:buSzPct val="100000"/>
               <a:defRPr sz="4800"/>
             </a:lvl8pPr>
-            <a:lvl9pPr algn="ctr">
+            <a:lvl9pPr lvl="8" algn="ctr">
               <a:spcBef>
                 <a:spcPts val="0"/>
               </a:spcBef>
@@ -730,7 +732,7 @@
       </p:sp>
       <p:sp>
         <p:nvSpPr>
-          <p:cNvPr id="14" name="Shape 14"/>
+          <p:cNvPr id="15" name="Shape 15"/>
           <p:cNvSpPr txBox="1"/>
           <p:nvPr>
             <p:ph idx="1" type="subTitle"/>
@@ -748,7 +750,7 @@
         <p:txBody>
           <a:bodyPr anchorCtr="0" anchor="t" bIns="91425" lIns="91425" rIns="91425" tIns="91425"/>
           <a:lstStyle>
-            <a:lvl1pPr algn="ctr">
+            <a:lvl1pPr lvl="0" algn="ctr">
               <a:lnSpc>
                 <a:spcPct val="100000"/>
               </a:lnSpc>
@@ -762,7 +764,7 @@
               <a:buNone/>
               <a:defRPr sz="2100"/>
             </a:lvl1pPr>
-            <a:lvl2pPr algn="ctr">
+            <a:lvl2pPr lvl="1" algn="ctr">
               <a:lnSpc>
                 <a:spcPct val="100000"/>
               </a:lnSpc>
@@ -776,7 +778,7 @@
               <a:buNone/>
               <a:defRPr sz="2100"/>
             </a:lvl2pPr>
-            <a:lvl3pPr algn="ctr">
+            <a:lvl3pPr lvl="2" algn="ctr">
               <a:lnSpc>
                 <a:spcPct val="100000"/>
               </a:lnSpc>
@@ -790,7 +792,7 @@
               <a:buNone/>
               <a:defRPr sz="2100"/>
             </a:lvl3pPr>
-            <a:lvl4pPr algn="ctr">
+            <a:lvl4pPr lvl="3" algn="ctr">
               <a:lnSpc>
                 <a:spcPct val="100000"/>
               </a:lnSpc>
@@ -804,7 +806,7 @@
               <a:buNone/>
               <a:defRPr sz="2100"/>
             </a:lvl4pPr>
-            <a:lvl5pPr algn="ctr">
+            <a:lvl5pPr lvl="4" algn="ctr">
               <a:lnSpc>
                 <a:spcPct val="100000"/>
               </a:lnSpc>
@@ -818,7 +820,7 @@
               <a:buNone/>
               <a:defRPr sz="2100"/>
             </a:lvl5pPr>
-            <a:lvl6pPr algn="ctr">
+            <a:lvl6pPr lvl="5" algn="ctr">
               <a:lnSpc>
                 <a:spcPct val="100000"/>
               </a:lnSpc>
@@ -832,7 +834,7 @@
               <a:buNone/>
               <a:defRPr sz="2100"/>
             </a:lvl6pPr>
-            <a:lvl7pPr algn="ctr">
+            <a:lvl7pPr lvl="6" algn="ctr">
               <a:lnSpc>
                 <a:spcPct val="100000"/>
               </a:lnSpc>
@@ -846,7 +848,7 @@
               <a:buNone/>
               <a:defRPr sz="2100"/>
             </a:lvl7pPr>
-            <a:lvl8pPr algn="ctr">
+            <a:lvl8pPr lvl="7" algn="ctr">
               <a:lnSpc>
                 <a:spcPct val="100000"/>
               </a:lnSpc>
@@ -860,7 +862,7 @@
               <a:buNone/>
               <a:defRPr sz="2100"/>
             </a:lvl8pPr>
-            <a:lvl9pPr algn="ctr">
+            <a:lvl9pPr lvl="8" algn="ctr">
               <a:lnSpc>
                 <a:spcPct val="100000"/>
               </a:lnSpc>
@@ -880,7 +882,7 @@
       </p:sp>
       <p:sp>
         <p:nvSpPr>
-          <p:cNvPr id="15" name="Shape 15"/>
+          <p:cNvPr id="16" name="Shape 16"/>
           <p:cNvSpPr txBox="1"/>
           <p:nvPr>
             <p:ph idx="12" type="sldNum"/>
@@ -901,7 +903,7 @@
           </a:bodyPr>
           <a:lstStyle/>
           <a:p>
-            <a:pPr>
+            <a:pPr lvl="0">
               <a:spcBef>
                 <a:spcPts val="0"/>
               </a:spcBef>
@@ -927,7 +929,7 @@
   <p:cSld name="Title and body">
     <p:spTree>
       <p:nvGrpSpPr>
-        <p:cNvPr id="16" name="Shape 16"/>
+        <p:cNvPr id="17" name="Shape 17"/>
         <p:cNvGrpSpPr/>
         <p:nvPr/>
       </p:nvGrpSpPr>
@@ -941,7 +943,7 @@
       </p:grpSpPr>
       <p:sp>
         <p:nvSpPr>
-          <p:cNvPr id="17" name="Shape 17"/>
+          <p:cNvPr id="18" name="Shape 18"/>
           <p:cNvSpPr txBox="1"/>
           <p:nvPr>
             <p:ph type="title"/>
@@ -959,55 +961,55 @@
         <p:txBody>
           <a:bodyPr anchorCtr="0" anchor="t" bIns="91425" lIns="91425" rIns="91425" tIns="91425"/>
           <a:lstStyle>
-            <a:lvl1pPr rtl="0">
+            <a:lvl1pPr lvl="0" rtl="0">
               <a:spcBef>
                 <a:spcPts val="0"/>
               </a:spcBef>
               <a:defRPr/>
             </a:lvl1pPr>
-            <a:lvl2pPr rtl="0">
+            <a:lvl2pPr lvl="1" rtl="0">
               <a:spcBef>
                 <a:spcPts val="0"/>
               </a:spcBef>
               <a:defRPr/>
             </a:lvl2pPr>
-            <a:lvl3pPr rtl="0">
+            <a:lvl3pPr lvl="2" rtl="0">
               <a:spcBef>
                 <a:spcPts val="0"/>
               </a:spcBef>
               <a:defRPr/>
             </a:lvl3pPr>
-            <a:lvl4pPr rtl="0">
+            <a:lvl4pPr lvl="3" rtl="0">
               <a:spcBef>
                 <a:spcPts val="0"/>
               </a:spcBef>
               <a:defRPr/>
             </a:lvl4pPr>
-            <a:lvl5pPr rtl="0">
+            <a:lvl5pPr lvl="4" rtl="0">
               <a:spcBef>
                 <a:spcPts val="0"/>
               </a:spcBef>
               <a:defRPr/>
             </a:lvl5pPr>
-            <a:lvl6pPr rtl="0">
+            <a:lvl6pPr lvl="5" rtl="0">
               <a:spcBef>
                 <a:spcPts val="0"/>
               </a:spcBef>
               <a:defRPr/>
             </a:lvl6pPr>
-            <a:lvl7pPr rtl="0">
+            <a:lvl7pPr lvl="6" rtl="0">
               <a:spcBef>
                 <a:spcPts val="0"/>
               </a:spcBef>
               <a:defRPr/>
             </a:lvl7pPr>
-            <a:lvl8pPr rtl="0">
+            <a:lvl8pPr lvl="7" rtl="0">
               <a:spcBef>
                 <a:spcPts val="0"/>
               </a:spcBef>
               <a:defRPr/>
             </a:lvl8pPr>
-            <a:lvl9pPr rtl="0">
+            <a:lvl9pPr lvl="8" rtl="0">
               <a:spcBef>
                 <a:spcPts val="0"/>
               </a:spcBef>
@@ -1019,7 +1021,7 @@
       </p:sp>
       <p:sp>
         <p:nvSpPr>
-          <p:cNvPr id="18" name="Shape 18"/>
+          <p:cNvPr id="19" name="Shape 19"/>
           <p:cNvSpPr txBox="1"/>
           <p:nvPr>
             <p:ph idx="1" type="body"/>
@@ -1037,62 +1039,62 @@
         <p:txBody>
           <a:bodyPr anchorCtr="0" anchor="t" bIns="91425" lIns="91425" rIns="91425" tIns="91425"/>
           <a:lstStyle>
-            <a:lvl1pPr rtl="0">
+            <a:lvl1pPr lvl="0" rtl="0">
               <a:spcBef>
                 <a:spcPts val="0"/>
               </a:spcBef>
               <a:defRPr/>
             </a:lvl1pPr>
-            <a:lvl2pPr rtl="0">
+            <a:lvl2pPr lvl="1" rtl="0">
               <a:spcBef>
                 <a:spcPts val="0"/>
               </a:spcBef>
               <a:buSzPct val="100000"/>
               <a:defRPr sz="3200"/>
             </a:lvl2pPr>
-            <a:lvl3pPr rtl="0">
+            <a:lvl3pPr lvl="2" rtl="0">
               <a:spcBef>
                 <a:spcPts val="0"/>
               </a:spcBef>
               <a:buSzPct val="100000"/>
               <a:defRPr sz="3200"/>
             </a:lvl3pPr>
-            <a:lvl4pPr rtl="0">
+            <a:lvl4pPr lvl="3" rtl="0">
               <a:spcBef>
                 <a:spcPts val="0"/>
               </a:spcBef>
               <a:buSzPct val="100000"/>
               <a:defRPr sz="3200"/>
             </a:lvl4pPr>
-            <a:lvl5pPr rtl="0">
+            <a:lvl5pPr lvl="4" rtl="0">
               <a:spcBef>
                 <a:spcPts val="0"/>
               </a:spcBef>
               <a:buSzPct val="100000"/>
               <a:defRPr sz="3200"/>
             </a:lvl5pPr>
-            <a:lvl6pPr rtl="0">
+            <a:lvl6pPr lvl="5" rtl="0">
               <a:spcBef>
                 <a:spcPts val="0"/>
               </a:spcBef>
               <a:buSzPct val="100000"/>
               <a:defRPr sz="3200"/>
             </a:lvl6pPr>
-            <a:lvl7pPr rtl="0">
+            <a:lvl7pPr lvl="6" rtl="0">
               <a:spcBef>
                 <a:spcPts val="0"/>
               </a:spcBef>
               <a:buSzPct val="100000"/>
               <a:defRPr sz="3200"/>
             </a:lvl7pPr>
-            <a:lvl8pPr rtl="0">
+            <a:lvl8pPr lvl="7" rtl="0">
               <a:spcBef>
                 <a:spcPts val="0"/>
               </a:spcBef>
               <a:buSzPct val="100000"/>
               <a:defRPr sz="3200"/>
             </a:lvl8pPr>
-            <a:lvl9pPr rtl="0">
+            <a:lvl9pPr lvl="8" rtl="0">
               <a:spcBef>
                 <a:spcPts val="0"/>
               </a:spcBef>
@@ -1105,7 +1107,7 @@
       </p:sp>
       <p:sp>
         <p:nvSpPr>
-          <p:cNvPr id="19" name="Shape 19"/>
+          <p:cNvPr id="20" name="Shape 20"/>
           <p:cNvSpPr txBox="1"/>
           <p:nvPr>
             <p:ph idx="12" type="sldNum"/>
@@ -1152,7 +1154,7 @@
   <p:cSld name="Blank">
     <p:spTree>
       <p:nvGrpSpPr>
-        <p:cNvPr id="20" name="Shape 20"/>
+        <p:cNvPr id="21" name="Shape 21"/>
         <p:cNvGrpSpPr/>
         <p:nvPr/>
       </p:nvGrpSpPr>
@@ -1166,7 +1168,7 @@
       </p:grpSpPr>
       <p:sp>
         <p:nvSpPr>
-          <p:cNvPr id="21" name="Shape 21"/>
+          <p:cNvPr id="22" name="Shape 22"/>
           <p:cNvSpPr txBox="1"/>
           <p:nvPr>
             <p:ph idx="12" type="sldNum"/>
@@ -1214,13 +1216,13 @@
     <p:bg>
       <p:bgPr>
         <a:solidFill>
-          <a:schemeClr val="lt1"/>
+          <a:srgbClr val="073763"/>
         </a:solidFill>
       </p:bgPr>
     </p:bg>
     <p:spTree>
       <p:nvGrpSpPr>
-        <p:cNvPr id="4" name="Shape 4"/>
+        <p:cNvPr id="5" name="Shape 5"/>
         <p:cNvGrpSpPr/>
         <p:nvPr/>
       </p:nvGrpSpPr>
@@ -1234,7 +1236,7 @@
       </p:grpSpPr>
       <p:sp>
         <p:nvSpPr>
-          <p:cNvPr id="5" name="Shape 5"/>
+          <p:cNvPr id="6" name="Shape 6"/>
           <p:cNvSpPr txBox="1"/>
           <p:nvPr>
             <p:ph type="title"/>
@@ -1256,19 +1258,19 @@
         <p:txBody>
           <a:bodyPr anchorCtr="0" anchor="t" bIns="91425" lIns="91425" rIns="91425" tIns="91425"/>
           <a:lstStyle>
-            <a:lvl1pPr algn="ctr">
+            <a:lvl1pPr lvl="0" algn="ctr">
               <a:spcBef>
                 <a:spcPts val="0"/>
               </a:spcBef>
               <a:buClr>
-                <a:schemeClr val="dk1"/>
+                <a:srgbClr val="FFFF00"/>
               </a:buClr>
               <a:buSzPct val="100000"/>
               <a:buFont typeface="Trebuchet MS"/>
               <a:buNone/>
               <a:defRPr sz="3600">
                 <a:solidFill>
-                  <a:schemeClr val="dk1"/>
+                  <a:srgbClr val="FFFF00"/>
                 </a:solidFill>
                 <a:latin typeface="Trebuchet MS"/>
                 <a:ea typeface="Trebuchet MS"/>
@@ -1276,19 +1278,19 @@
                 <a:sym typeface="Trebuchet MS"/>
               </a:defRPr>
             </a:lvl1pPr>
-            <a:lvl2pPr>
+            <a:lvl2pPr lvl="1">
               <a:spcBef>
                 <a:spcPts val="0"/>
               </a:spcBef>
               <a:buClr>
-                <a:schemeClr val="dk1"/>
+                <a:srgbClr val="FFFF00"/>
               </a:buClr>
               <a:buSzPct val="100000"/>
               <a:buFont typeface="Oswald"/>
               <a:buNone/>
               <a:defRPr sz="3000">
                 <a:solidFill>
-                  <a:schemeClr val="dk1"/>
+                  <a:srgbClr val="FFFF00"/>
                 </a:solidFill>
                 <a:latin typeface="Oswald"/>
                 <a:ea typeface="Oswald"/>
@@ -1296,19 +1298,19 @@
                 <a:sym typeface="Oswald"/>
               </a:defRPr>
             </a:lvl2pPr>
-            <a:lvl3pPr>
+            <a:lvl3pPr lvl="2">
               <a:spcBef>
                 <a:spcPts val="0"/>
               </a:spcBef>
               <a:buClr>
-                <a:schemeClr val="dk1"/>
+                <a:srgbClr val="FFFF00"/>
               </a:buClr>
               <a:buSzPct val="100000"/>
               <a:buFont typeface="Oswald"/>
               <a:buNone/>
               <a:defRPr sz="3000">
                 <a:solidFill>
-                  <a:schemeClr val="dk1"/>
+                  <a:srgbClr val="FFFF00"/>
                 </a:solidFill>
                 <a:latin typeface="Oswald"/>
                 <a:ea typeface="Oswald"/>
@@ -1316,19 +1318,19 @@
                 <a:sym typeface="Oswald"/>
               </a:defRPr>
             </a:lvl3pPr>
-            <a:lvl4pPr>
+            <a:lvl4pPr lvl="3">
               <a:spcBef>
                 <a:spcPts val="0"/>
               </a:spcBef>
               <a:buClr>
-                <a:schemeClr val="dk1"/>
+                <a:srgbClr val="FFFF00"/>
               </a:buClr>
               <a:buSzPct val="100000"/>
               <a:buFont typeface="Oswald"/>
               <a:buNone/>
               <a:defRPr sz="3000">
                 <a:solidFill>
-                  <a:schemeClr val="dk1"/>
+                  <a:srgbClr val="FFFF00"/>
                 </a:solidFill>
                 <a:latin typeface="Oswald"/>
                 <a:ea typeface="Oswald"/>
@@ -1336,19 +1338,19 @@
                 <a:sym typeface="Oswald"/>
               </a:defRPr>
             </a:lvl4pPr>
-            <a:lvl5pPr>
+            <a:lvl5pPr lvl="4">
               <a:spcBef>
                 <a:spcPts val="0"/>
               </a:spcBef>
               <a:buClr>
-                <a:schemeClr val="dk1"/>
+                <a:srgbClr val="FFFF00"/>
               </a:buClr>
               <a:buSzPct val="100000"/>
               <a:buFont typeface="Oswald"/>
               <a:buNone/>
               <a:defRPr sz="3000">
                 <a:solidFill>
-                  <a:schemeClr val="dk1"/>
+                  <a:srgbClr val="FFFF00"/>
                 </a:solidFill>
                 <a:latin typeface="Oswald"/>
                 <a:ea typeface="Oswald"/>
@@ -1356,19 +1358,19 @@
                 <a:sym typeface="Oswald"/>
               </a:defRPr>
             </a:lvl5pPr>
-            <a:lvl6pPr>
+            <a:lvl6pPr lvl="5">
               <a:spcBef>
                 <a:spcPts val="0"/>
               </a:spcBef>
               <a:buClr>
-                <a:schemeClr val="dk1"/>
+                <a:srgbClr val="FFFF00"/>
               </a:buClr>
               <a:buSzPct val="100000"/>
               <a:buFont typeface="Oswald"/>
               <a:buNone/>
               <a:defRPr sz="3000">
                 <a:solidFill>
-                  <a:schemeClr val="dk1"/>
+                  <a:srgbClr val="FFFF00"/>
                 </a:solidFill>
                 <a:latin typeface="Oswald"/>
                 <a:ea typeface="Oswald"/>
@@ -1376,19 +1378,19 @@
                 <a:sym typeface="Oswald"/>
               </a:defRPr>
             </a:lvl6pPr>
-            <a:lvl7pPr>
+            <a:lvl7pPr lvl="6">
               <a:spcBef>
                 <a:spcPts val="0"/>
               </a:spcBef>
               <a:buClr>
-                <a:schemeClr val="dk1"/>
+                <a:srgbClr val="FFFF00"/>
               </a:buClr>
               <a:buSzPct val="100000"/>
               <a:buFont typeface="Oswald"/>
               <a:buNone/>
               <a:defRPr sz="3000">
                 <a:solidFill>
-                  <a:schemeClr val="dk1"/>
+                  <a:srgbClr val="FFFF00"/>
                 </a:solidFill>
                 <a:latin typeface="Oswald"/>
                 <a:ea typeface="Oswald"/>
@@ -1396,19 +1398,19 @@
                 <a:sym typeface="Oswald"/>
               </a:defRPr>
             </a:lvl7pPr>
-            <a:lvl8pPr>
+            <a:lvl8pPr lvl="7">
               <a:spcBef>
                 <a:spcPts val="0"/>
               </a:spcBef>
               <a:buClr>
-                <a:schemeClr val="dk1"/>
+                <a:srgbClr val="FFFF00"/>
               </a:buClr>
               <a:buSzPct val="100000"/>
               <a:buFont typeface="Oswald"/>
               <a:buNone/>
               <a:defRPr sz="3000">
                 <a:solidFill>
-                  <a:schemeClr val="dk1"/>
+                  <a:srgbClr val="FFFF00"/>
                 </a:solidFill>
                 <a:latin typeface="Oswald"/>
                 <a:ea typeface="Oswald"/>
@@ -1416,19 +1418,19 @@
                 <a:sym typeface="Oswald"/>
               </a:defRPr>
             </a:lvl8pPr>
-            <a:lvl9pPr>
+            <a:lvl9pPr lvl="8">
               <a:spcBef>
                 <a:spcPts val="0"/>
               </a:spcBef>
               <a:buClr>
-                <a:schemeClr val="dk1"/>
+                <a:srgbClr val="FFFF00"/>
               </a:buClr>
               <a:buSzPct val="100000"/>
               <a:buFont typeface="Oswald"/>
               <a:buNone/>
               <a:defRPr sz="3000">
                 <a:solidFill>
-                  <a:schemeClr val="dk1"/>
+                  <a:srgbClr val="FFFF00"/>
                 </a:solidFill>
                 <a:latin typeface="Oswald"/>
                 <a:ea typeface="Oswald"/>
@@ -1442,7 +1444,7 @@
       </p:sp>
       <p:sp>
         <p:nvSpPr>
-          <p:cNvPr id="6" name="Shape 6"/>
+          <p:cNvPr id="7" name="Shape 7"/>
           <p:cNvSpPr txBox="1"/>
           <p:nvPr>
             <p:ph idx="1" type="body"/>
@@ -1464,7 +1466,7 @@
         <p:txBody>
           <a:bodyPr anchorCtr="0" anchor="t" bIns="91425" lIns="91425" rIns="91425" tIns="91425"/>
           <a:lstStyle>
-            <a:lvl1pPr>
+            <a:lvl1pPr lvl="0">
               <a:lnSpc>
                 <a:spcPct val="100000"/>
               </a:lnSpc>
@@ -1475,14 +1477,14 @@
                 <a:spcPts val="0"/>
               </a:spcAft>
               <a:buClr>
-                <a:schemeClr val="accent6"/>
+                <a:srgbClr val="FFFF00"/>
               </a:buClr>
               <a:buSzPct val="100000"/>
               <a:buFont typeface="Calibri"/>
               <a:buAutoNum type="arabicPeriod"/>
               <a:defRPr sz="3200">
                 <a:solidFill>
-                  <a:schemeClr val="accent6"/>
+                  <a:srgbClr val="FFFF00"/>
                 </a:solidFill>
                 <a:latin typeface="Calibri"/>
                 <a:ea typeface="Calibri"/>
@@ -1490,7 +1492,7 @@
                 <a:sym typeface="Calibri"/>
               </a:defRPr>
             </a:lvl1pPr>
-            <a:lvl2pPr>
+            <a:lvl2pPr lvl="1">
               <a:lnSpc>
                 <a:spcPct val="115000"/>
               </a:lnSpc>
@@ -1501,14 +1503,14 @@
                 <a:spcPts val="1600"/>
               </a:spcAft>
               <a:buClr>
-                <a:schemeClr val="accent6"/>
+                <a:srgbClr val="FFFF00"/>
               </a:buClr>
               <a:buSzPct val="100000"/>
               <a:buFont typeface="Calibri"/>
               <a:buAutoNum type="alphaLcPeriod"/>
               <a:defRPr sz="3200">
                 <a:solidFill>
-                  <a:schemeClr val="accent6"/>
+                  <a:srgbClr val="FFFF00"/>
                 </a:solidFill>
                 <a:latin typeface="Calibri"/>
                 <a:ea typeface="Calibri"/>
@@ -1516,7 +1518,7 @@
                 <a:sym typeface="Calibri"/>
               </a:defRPr>
             </a:lvl2pPr>
-            <a:lvl3pPr>
+            <a:lvl3pPr lvl="2">
               <a:lnSpc>
                 <a:spcPct val="115000"/>
               </a:lnSpc>
@@ -1527,14 +1529,14 @@
                 <a:spcPts val="1600"/>
               </a:spcAft>
               <a:buClr>
-                <a:schemeClr val="accent6"/>
+                <a:srgbClr val="FFFF00"/>
               </a:buClr>
               <a:buSzPct val="100000"/>
               <a:buFont typeface="Calibri"/>
               <a:buAutoNum type="romanLcPeriod"/>
               <a:defRPr sz="3200">
                 <a:solidFill>
-                  <a:schemeClr val="accent6"/>
+                  <a:srgbClr val="FFFF00"/>
                 </a:solidFill>
                 <a:latin typeface="Calibri"/>
                 <a:ea typeface="Calibri"/>
@@ -1542,7 +1544,7 @@
                 <a:sym typeface="Calibri"/>
               </a:defRPr>
             </a:lvl3pPr>
-            <a:lvl4pPr>
+            <a:lvl4pPr lvl="3">
               <a:lnSpc>
                 <a:spcPct val="115000"/>
               </a:lnSpc>
@@ -1553,14 +1555,14 @@
                 <a:spcPts val="1600"/>
               </a:spcAft>
               <a:buClr>
-                <a:schemeClr val="accent6"/>
+                <a:srgbClr val="FFFF00"/>
               </a:buClr>
               <a:buSzPct val="100000"/>
               <a:buFont typeface="Calibri"/>
               <a:buAutoNum type="arabicPeriod"/>
               <a:defRPr sz="3200">
                 <a:solidFill>
-                  <a:schemeClr val="accent6"/>
+                  <a:srgbClr val="FFFF00"/>
                 </a:solidFill>
                 <a:latin typeface="Calibri"/>
                 <a:ea typeface="Calibri"/>
@@ -1568,7 +1570,7 @@
                 <a:sym typeface="Calibri"/>
               </a:defRPr>
             </a:lvl4pPr>
-            <a:lvl5pPr>
+            <a:lvl5pPr lvl="4">
               <a:lnSpc>
                 <a:spcPct val="115000"/>
               </a:lnSpc>
@@ -1579,14 +1581,14 @@
                 <a:spcPts val="1600"/>
               </a:spcAft>
               <a:buClr>
-                <a:schemeClr val="accent6"/>
+                <a:srgbClr val="FFFF00"/>
               </a:buClr>
               <a:buSzPct val="100000"/>
               <a:buFont typeface="Calibri"/>
               <a:buAutoNum type="alphaLcPeriod"/>
               <a:defRPr sz="3200">
                 <a:solidFill>
-                  <a:schemeClr val="accent6"/>
+                  <a:srgbClr val="FFFF00"/>
                 </a:solidFill>
                 <a:latin typeface="Calibri"/>
                 <a:ea typeface="Calibri"/>
@@ -1594,7 +1596,7 @@
                 <a:sym typeface="Calibri"/>
               </a:defRPr>
             </a:lvl5pPr>
-            <a:lvl6pPr>
+            <a:lvl6pPr lvl="5">
               <a:lnSpc>
                 <a:spcPct val="115000"/>
               </a:lnSpc>
@@ -1605,14 +1607,14 @@
                 <a:spcPts val="1600"/>
               </a:spcAft>
               <a:buClr>
-                <a:schemeClr val="accent6"/>
+                <a:srgbClr val="FFFF00"/>
               </a:buClr>
               <a:buSzPct val="100000"/>
               <a:buFont typeface="Calibri"/>
               <a:buAutoNum type="romanLcPeriod"/>
               <a:defRPr sz="3200">
                 <a:solidFill>
-                  <a:schemeClr val="accent6"/>
+                  <a:srgbClr val="FFFF00"/>
                 </a:solidFill>
                 <a:latin typeface="Calibri"/>
                 <a:ea typeface="Calibri"/>
@@ -1620,7 +1622,7 @@
                 <a:sym typeface="Calibri"/>
               </a:defRPr>
             </a:lvl6pPr>
-            <a:lvl7pPr>
+            <a:lvl7pPr lvl="6">
               <a:lnSpc>
                 <a:spcPct val="115000"/>
               </a:lnSpc>
@@ -1631,14 +1633,14 @@
                 <a:spcPts val="1600"/>
               </a:spcAft>
               <a:buClr>
-                <a:schemeClr val="accent6"/>
+                <a:srgbClr val="FFFF00"/>
               </a:buClr>
               <a:buSzPct val="100000"/>
               <a:buFont typeface="Calibri"/>
               <a:buAutoNum type="arabicPeriod"/>
               <a:defRPr sz="3200">
                 <a:solidFill>
-                  <a:schemeClr val="accent6"/>
+                  <a:srgbClr val="FFFF00"/>
                 </a:solidFill>
                 <a:latin typeface="Calibri"/>
                 <a:ea typeface="Calibri"/>
@@ -1646,7 +1648,7 @@
                 <a:sym typeface="Calibri"/>
               </a:defRPr>
             </a:lvl7pPr>
-            <a:lvl8pPr>
+            <a:lvl8pPr lvl="7">
               <a:lnSpc>
                 <a:spcPct val="115000"/>
               </a:lnSpc>
@@ -1657,14 +1659,14 @@
                 <a:spcPts val="1600"/>
               </a:spcAft>
               <a:buClr>
-                <a:schemeClr val="accent6"/>
+                <a:srgbClr val="FFFF00"/>
               </a:buClr>
               <a:buSzPct val="100000"/>
               <a:buFont typeface="Calibri"/>
               <a:buAutoNum type="alphaLcPeriod"/>
               <a:defRPr sz="3200">
                 <a:solidFill>
-                  <a:schemeClr val="accent6"/>
+                  <a:srgbClr val="FFFF00"/>
                 </a:solidFill>
                 <a:latin typeface="Calibri"/>
                 <a:ea typeface="Calibri"/>
@@ -1672,7 +1674,7 @@
                 <a:sym typeface="Calibri"/>
               </a:defRPr>
             </a:lvl8pPr>
-            <a:lvl9pPr>
+            <a:lvl9pPr lvl="8">
               <a:lnSpc>
                 <a:spcPct val="115000"/>
               </a:lnSpc>
@@ -1683,14 +1685,14 @@
                 <a:spcPts val="1600"/>
               </a:spcAft>
               <a:buClr>
-                <a:schemeClr val="accent6"/>
+                <a:srgbClr val="FFFF00"/>
               </a:buClr>
               <a:buSzPct val="100000"/>
               <a:buFont typeface="Calibri"/>
               <a:buAutoNum type="romanLcPeriod"/>
               <a:defRPr sz="3200">
                 <a:solidFill>
-                  <a:schemeClr val="accent6"/>
+                  <a:srgbClr val="FFFF00"/>
                 </a:solidFill>
                 <a:latin typeface="Calibri"/>
                 <a:ea typeface="Calibri"/>
@@ -1704,7 +1706,7 @@
       </p:sp>
       <p:sp>
         <p:nvSpPr>
-          <p:cNvPr id="7" name="Shape 7"/>
+          <p:cNvPr id="8" name="Shape 8"/>
           <p:cNvSpPr txBox="1"/>
           <p:nvPr>
             <p:ph idx="12" type="sldNum"/>
@@ -1729,7 +1731,7 @@
           </a:bodyPr>
           <a:lstStyle/>
           <a:p>
-            <a:pPr algn="r">
+            <a:pPr lvl="0" algn="r">
               <a:spcBef>
                 <a:spcPts val="0"/>
               </a:spcBef>
@@ -1738,7 +1740,7 @@
             <a:fld id="{00000000-1234-1234-1234-123412341234}" type="slidenum">
               <a:rPr lang="en-GB" sz="1000">
                 <a:solidFill>
-                  <a:schemeClr val="accent3"/>
+                  <a:srgbClr val="FFFF00"/>
                 </a:solidFill>
                 <a:latin typeface="Average"/>
                 <a:ea typeface="Average"/>
@@ -1761,7 +1763,7 @@
   <p:hf dt="0" ftr="0" hdr="0" sldNum="0"/>
   <p:txStyles>
     <p:titleStyle>
-      <a:defPPr marR="0" rtl="0" algn="l">
+      <a:defPPr lvl="0" marR="0" rtl="0" algn="l">
         <a:lnSpc>
           <a:spcPct val="100000"/>
         </a:lnSpc>
@@ -1772,7 +1774,7 @@
           <a:spcPts val="0"/>
         </a:spcAft>
       </a:defPPr>
-      <a:lvl1pPr marR="0" rtl="0" algn="l">
+      <a:lvl1pPr lvl="0" marR="0" rtl="0" algn="l">
         <a:lnSpc>
           <a:spcPct val="100000"/>
         </a:lnSpc>
@@ -1783,7 +1785,7 @@
           <a:spcPts val="0"/>
         </a:spcAft>
         <a:buNone/>
-        <a:defRPr b="0" baseline="0" i="0" sz="1400" u="none" cap="none" strike="noStrike">
+        <a:defRPr b="0" i="0" sz="1400" u="none" cap="none" strike="noStrike">
           <a:solidFill>
             <a:srgbClr val="000000"/>
           </a:solidFill>
@@ -1796,7 +1798,7 @@
       </a:lvl1pPr>
     </p:titleStyle>
     <p:bodyStyle>
-      <a:defPPr marR="0" rtl="0" algn="l">
+      <a:defPPr lvl="0" marR="0" rtl="0" algn="l">
         <a:lnSpc>
           <a:spcPct val="100000"/>
         </a:lnSpc>
@@ -1807,7 +1809,7 @@
           <a:spcPts val="0"/>
         </a:spcAft>
       </a:defPPr>
-      <a:lvl1pPr marR="0" rtl="0" algn="l">
+      <a:lvl1pPr lvl="0" marR="0" rtl="0" algn="l">
         <a:lnSpc>
           <a:spcPct val="100000"/>
         </a:lnSpc>
@@ -1818,7 +1820,7 @@
           <a:spcPts val="0"/>
         </a:spcAft>
         <a:buNone/>
-        <a:defRPr b="0" baseline="0" i="0" sz="1400" u="none" cap="none" strike="noStrike">
+        <a:defRPr b="0" i="0" sz="1400" u="none" cap="none" strike="noStrike">
           <a:solidFill>
             <a:srgbClr val="000000"/>
           </a:solidFill>
@@ -1829,7 +1831,7 @@
           <a:rtl val="0"/>
         </a:defRPr>
       </a:lvl1pPr>
-      <a:lvl2pPr marR="0" rtl="0" algn="l">
+      <a:lvl2pPr lvl="1" marR="0" rtl="0" algn="l">
         <a:lnSpc>
           <a:spcPct val="100000"/>
         </a:lnSpc>
@@ -1840,7 +1842,7 @@
           <a:spcPts val="0"/>
         </a:spcAft>
         <a:buNone/>
-        <a:defRPr b="0" baseline="0" i="0" sz="1400" u="none" cap="none" strike="noStrike">
+        <a:defRPr b="0" i="0" sz="1400" u="none" cap="none" strike="noStrike">
           <a:solidFill>
             <a:srgbClr val="000000"/>
           </a:solidFill>
@@ -1851,7 +1853,7 @@
           <a:rtl val="0"/>
         </a:defRPr>
       </a:lvl2pPr>
-      <a:lvl3pPr marR="0" rtl="0" algn="l">
+      <a:lvl3pPr lvl="2" marR="0" rtl="0" algn="l">
         <a:lnSpc>
           <a:spcPct val="100000"/>
         </a:lnSpc>
@@ -1862,7 +1864,7 @@
           <a:spcPts val="0"/>
         </a:spcAft>
         <a:buNone/>
-        <a:defRPr b="0" baseline="0" i="0" sz="1400" u="none" cap="none" strike="noStrike">
+        <a:defRPr b="0" i="0" sz="1400" u="none" cap="none" strike="noStrike">
           <a:solidFill>
             <a:srgbClr val="000000"/>
           </a:solidFill>
@@ -1873,7 +1875,7 @@
           <a:rtl val="0"/>
         </a:defRPr>
       </a:lvl3pPr>
-      <a:lvl4pPr marR="0" rtl="0" algn="l">
+      <a:lvl4pPr lvl="3" marR="0" rtl="0" algn="l">
         <a:lnSpc>
           <a:spcPct val="100000"/>
         </a:lnSpc>
@@ -1884,7 +1886,7 @@
           <a:spcPts val="0"/>
         </a:spcAft>
         <a:buNone/>
-        <a:defRPr b="0" baseline="0" i="0" sz="1400" u="none" cap="none" strike="noStrike">
+        <a:defRPr b="0" i="0" sz="1400" u="none" cap="none" strike="noStrike">
           <a:solidFill>
             <a:srgbClr val="000000"/>
           </a:solidFill>
@@ -1895,7 +1897,7 @@
           <a:rtl val="0"/>
         </a:defRPr>
       </a:lvl4pPr>
-      <a:lvl5pPr marR="0" rtl="0" algn="l">
+      <a:lvl5pPr lvl="4" marR="0" rtl="0" algn="l">
         <a:lnSpc>
           <a:spcPct val="100000"/>
         </a:lnSpc>
@@ -1906,7 +1908,7 @@
           <a:spcPts val="0"/>
         </a:spcAft>
         <a:buNone/>
-        <a:defRPr b="0" baseline="0" i="0" sz="1400" u="none" cap="none" strike="noStrike">
+        <a:defRPr b="0" i="0" sz="1400" u="none" cap="none" strike="noStrike">
           <a:solidFill>
             <a:srgbClr val="000000"/>
           </a:solidFill>
@@ -1917,7 +1919,7 @@
           <a:rtl val="0"/>
         </a:defRPr>
       </a:lvl5pPr>
-      <a:lvl6pPr marR="0" rtl="0" algn="l">
+      <a:lvl6pPr lvl="5" marR="0" rtl="0" algn="l">
         <a:lnSpc>
           <a:spcPct val="100000"/>
         </a:lnSpc>
@@ -1928,7 +1930,7 @@
           <a:spcPts val="0"/>
         </a:spcAft>
         <a:buNone/>
-        <a:defRPr b="0" baseline="0" i="0" sz="1400" u="none" cap="none" strike="noStrike">
+        <a:defRPr b="0" i="0" sz="1400" u="none" cap="none" strike="noStrike">
           <a:solidFill>
             <a:srgbClr val="000000"/>
           </a:solidFill>
@@ -1939,7 +1941,7 @@
           <a:rtl val="0"/>
         </a:defRPr>
       </a:lvl6pPr>
-      <a:lvl7pPr marR="0" rtl="0" algn="l">
+      <a:lvl7pPr lvl="6" marR="0" rtl="0" algn="l">
         <a:lnSpc>
           <a:spcPct val="100000"/>
         </a:lnSpc>
@@ -1950,7 +1952,7 @@
           <a:spcPts val="0"/>
         </a:spcAft>
         <a:buNone/>
-        <a:defRPr b="0" baseline="0" i="0" sz="1400" u="none" cap="none" strike="noStrike">
+        <a:defRPr b="0" i="0" sz="1400" u="none" cap="none" strike="noStrike">
           <a:solidFill>
             <a:srgbClr val="000000"/>
           </a:solidFill>
@@ -1961,7 +1963,7 @@
           <a:rtl val="0"/>
         </a:defRPr>
       </a:lvl7pPr>
-      <a:lvl8pPr marR="0" rtl="0" algn="l">
+      <a:lvl8pPr lvl="7" marR="0" rtl="0" algn="l">
         <a:lnSpc>
           <a:spcPct val="100000"/>
         </a:lnSpc>
@@ -1972,7 +1974,7 @@
           <a:spcPts val="0"/>
         </a:spcAft>
         <a:buNone/>
-        <a:defRPr b="0" baseline="0" i="0" sz="1400" u="none" cap="none" strike="noStrike">
+        <a:defRPr b="0" i="0" sz="1400" u="none" cap="none" strike="noStrike">
           <a:solidFill>
             <a:srgbClr val="000000"/>
           </a:solidFill>
@@ -1983,7 +1985,7 @@
           <a:rtl val="0"/>
         </a:defRPr>
       </a:lvl8pPr>
-      <a:lvl9pPr marR="0" rtl="0" algn="l">
+      <a:lvl9pPr lvl="8" marR="0" rtl="0" algn="l">
         <a:lnSpc>
           <a:spcPct val="100000"/>
         </a:lnSpc>
@@ -1994,7 +1996,7 @@
           <a:spcPts val="0"/>
         </a:spcAft>
         <a:buNone/>
-        <a:defRPr b="0" baseline="0" i="0" sz="1400" u="none" cap="none" strike="noStrike">
+        <a:defRPr b="0" i="0" sz="1400" u="none" cap="none" strike="noStrike">
           <a:solidFill>
             <a:srgbClr val="000000"/>
           </a:solidFill>
@@ -2007,7 +2009,7 @@
       </a:lvl9pPr>
     </p:bodyStyle>
     <p:otherStyle>
-      <a:defPPr marR="0" rtl="0" algn="l">
+      <a:defPPr lvl="0" marR="0" rtl="0" algn="l">
         <a:lnSpc>
           <a:spcPct val="100000"/>
         </a:lnSpc>
@@ -2018,7 +2020,7 @@
           <a:spcPts val="0"/>
         </a:spcAft>
       </a:defPPr>
-      <a:lvl1pPr marR="0" rtl="0" algn="l">
+      <a:lvl1pPr lvl="0" marR="0" rtl="0" algn="l">
         <a:lnSpc>
           <a:spcPct val="100000"/>
         </a:lnSpc>
@@ -2029,7 +2031,7 @@
           <a:spcPts val="0"/>
         </a:spcAft>
         <a:buNone/>
-        <a:defRPr b="0" baseline="0" i="0" sz="1400" u="none" cap="none" strike="noStrike">
+        <a:defRPr b="0" i="0" sz="1400" u="none" cap="none" strike="noStrike">
           <a:solidFill>
             <a:srgbClr val="000000"/>
           </a:solidFill>
@@ -2040,7 +2042,7 @@
           <a:rtl val="0"/>
         </a:defRPr>
       </a:lvl1pPr>
-      <a:lvl2pPr marR="0" rtl="0" algn="l">
+      <a:lvl2pPr lvl="1" marR="0" rtl="0" algn="l">
         <a:lnSpc>
           <a:spcPct val="100000"/>
         </a:lnSpc>
@@ -2051,7 +2053,7 @@
           <a:spcPts val="0"/>
         </a:spcAft>
         <a:buNone/>
-        <a:defRPr b="0" baseline="0" i="0" sz="1400" u="none" cap="none" strike="noStrike">
+        <a:defRPr b="0" i="0" sz="1400" u="none" cap="none" strike="noStrike">
           <a:solidFill>
             <a:srgbClr val="000000"/>
           </a:solidFill>
@@ -2062,7 +2064,7 @@
           <a:rtl val="0"/>
         </a:defRPr>
       </a:lvl2pPr>
-      <a:lvl3pPr marR="0" rtl="0" algn="l">
+      <a:lvl3pPr lvl="2" marR="0" rtl="0" algn="l">
         <a:lnSpc>
           <a:spcPct val="100000"/>
         </a:lnSpc>
@@ -2073,7 +2075,7 @@
           <a:spcPts val="0"/>
         </a:spcAft>
         <a:buNone/>
-        <a:defRPr b="0" baseline="0" i="0" sz="1400" u="none" cap="none" strike="noStrike">
+        <a:defRPr b="0" i="0" sz="1400" u="none" cap="none" strike="noStrike">
           <a:solidFill>
             <a:srgbClr val="000000"/>
           </a:solidFill>
@@ -2084,7 +2086,7 @@
           <a:rtl val="0"/>
         </a:defRPr>
       </a:lvl3pPr>
-      <a:lvl4pPr marR="0" rtl="0" algn="l">
+      <a:lvl4pPr lvl="3" marR="0" rtl="0" algn="l">
         <a:lnSpc>
           <a:spcPct val="100000"/>
         </a:lnSpc>
@@ -2095,7 +2097,7 @@
           <a:spcPts val="0"/>
         </a:spcAft>
         <a:buNone/>
-        <a:defRPr b="0" baseline="0" i="0" sz="1400" u="none" cap="none" strike="noStrike">
+        <a:defRPr b="0" i="0" sz="1400" u="none" cap="none" strike="noStrike">
           <a:solidFill>
             <a:srgbClr val="000000"/>
           </a:solidFill>
@@ -2106,7 +2108,7 @@
           <a:rtl val="0"/>
         </a:defRPr>
       </a:lvl4pPr>
-      <a:lvl5pPr marR="0" rtl="0" algn="l">
+      <a:lvl5pPr lvl="4" marR="0" rtl="0" algn="l">
         <a:lnSpc>
           <a:spcPct val="100000"/>
         </a:lnSpc>
@@ -2117,7 +2119,7 @@
           <a:spcPts val="0"/>
         </a:spcAft>
         <a:buNone/>
-        <a:defRPr b="0" baseline="0" i="0" sz="1400" u="none" cap="none" strike="noStrike">
+        <a:defRPr b="0" i="0" sz="1400" u="none" cap="none" strike="noStrike">
           <a:solidFill>
             <a:srgbClr val="000000"/>
           </a:solidFill>
@@ -2128,7 +2130,7 @@
           <a:rtl val="0"/>
         </a:defRPr>
       </a:lvl5pPr>
-      <a:lvl6pPr marR="0" rtl="0" algn="l">
+      <a:lvl6pPr lvl="5" marR="0" rtl="0" algn="l">
         <a:lnSpc>
           <a:spcPct val="100000"/>
         </a:lnSpc>
@@ -2139,7 +2141,7 @@
           <a:spcPts val="0"/>
         </a:spcAft>
         <a:buNone/>
-        <a:defRPr b="0" baseline="0" i="0" sz="1400" u="none" cap="none" strike="noStrike">
+        <a:defRPr b="0" i="0" sz="1400" u="none" cap="none" strike="noStrike">
           <a:solidFill>
             <a:srgbClr val="000000"/>
           </a:solidFill>
@@ -2150,7 +2152,7 @@
           <a:rtl val="0"/>
         </a:defRPr>
       </a:lvl6pPr>
-      <a:lvl7pPr marR="0" rtl="0" algn="l">
+      <a:lvl7pPr lvl="6" marR="0" rtl="0" algn="l">
         <a:lnSpc>
           <a:spcPct val="100000"/>
         </a:lnSpc>
@@ -2161,7 +2163,7 @@
           <a:spcPts val="0"/>
         </a:spcAft>
         <a:buNone/>
-        <a:defRPr b="0" baseline="0" i="0" sz="1400" u="none" cap="none" strike="noStrike">
+        <a:defRPr b="0" i="0" sz="1400" u="none" cap="none" strike="noStrike">
           <a:solidFill>
             <a:srgbClr val="000000"/>
           </a:solidFill>
@@ -2172,7 +2174,7 @@
           <a:rtl val="0"/>
         </a:defRPr>
       </a:lvl7pPr>
-      <a:lvl8pPr marR="0" rtl="0" algn="l">
+      <a:lvl8pPr lvl="7" marR="0" rtl="0" algn="l">
         <a:lnSpc>
           <a:spcPct val="100000"/>
         </a:lnSpc>
@@ -2183,7 +2185,7 @@
           <a:spcPts val="0"/>
         </a:spcAft>
         <a:buNone/>
-        <a:defRPr b="0" baseline="0" i="0" sz="1400" u="none" cap="none" strike="noStrike">
+        <a:defRPr b="0" i="0" sz="1400" u="none" cap="none" strike="noStrike">
           <a:solidFill>
             <a:srgbClr val="000000"/>
           </a:solidFill>
@@ -2194,7 +2196,7 @@
           <a:rtl val="0"/>
         </a:defRPr>
       </a:lvl8pPr>
-      <a:lvl9pPr marR="0" rtl="0" algn="l">
+      <a:lvl9pPr lvl="8" marR="0" rtl="0" algn="l">
         <a:lnSpc>
           <a:spcPct val="100000"/>
         </a:lnSpc>
@@ -2205,7 +2207,7 @@
           <a:spcPts val="0"/>
         </a:spcAft>
         <a:buNone/>
-        <a:defRPr b="0" baseline="0" i="0" sz="1400" u="none" cap="none" strike="noStrike">
+        <a:defRPr b="0" i="0" sz="1400" u="none" cap="none" strike="noStrike">
           <a:solidFill>
             <a:srgbClr val="000000"/>
           </a:solidFill>
@@ -2221,7 +2223,314 @@
 </p:sldMaster>
 </file>
 
+<file path=ppt/slides/slide1.xml><?xml version="1.0" encoding="utf-8"?>
+<p:sld xmlns:a="http://schemas.openxmlformats.org/drawingml/2006/main" xmlns:r="http://schemas.openxmlformats.org/officeDocument/2006/relationships" xmlns:mc="http://schemas.openxmlformats.org/markup-compatibility/2006" xmlns:mv="urn:schemas-microsoft-com:mac:vml" xmlns:p="http://schemas.openxmlformats.org/presentationml/2006/main" xmlns:c="http://schemas.openxmlformats.org/drawingml/2006/chart" xmlns:dgm="http://schemas.openxmlformats.org/drawingml/2006/diagram" xmlns:o="urn:schemas-microsoft-com:office:office" xmlns:v="urn:schemas-microsoft-com:vml" xmlns:pvml="urn:schemas-microsoft-com:office:powerpoint" xmlns:com="http://schemas.openxmlformats.org/drawingml/2006/compatibility" xmlns:p14="http://schemas.microsoft.com/office/powerpoint/2010/main">
+  <p:cSld>
+    <p:spTree>
+      <p:nvGrpSpPr>
+        <p:cNvPr id="26" name="Shape 26"/>
+        <p:cNvGrpSpPr/>
+        <p:nvPr/>
+      </p:nvGrpSpPr>
+      <p:grpSpPr>
+        <a:xfrm>
+          <a:off x="0" y="0"/>
+          <a:ext cx="0" cy="0"/>
+          <a:chOff x="0" y="0"/>
+          <a:chExt cx="0" cy="0"/>
+        </a:xfrm>
+      </p:grpSpPr>
+    </p:spTree>
+  </p:cSld>
+  <p:clrMapOvr>
+    <a:masterClrMapping/>
+  </p:clrMapOvr>
+  <p:transition spd="slow">
+    <p:cut/>
+  </p:transition>
+</p:sld>
+</file>
+
 <file path=ppt/theme/theme1.xml><?xml version="1.0" encoding="utf-8"?>
+<a:theme xmlns:a="http://schemas.openxmlformats.org/drawingml/2006/main" xmlns:r="http://schemas.openxmlformats.org/officeDocument/2006/relationships" name="Custom Theme">
+  <a:themeElements>
+    <a:clrScheme name="Default">
+      <a:dk1>
+        <a:srgbClr val="000000"/>
+      </a:dk1>
+      <a:lt1>
+        <a:srgbClr val="FFFFFF"/>
+      </a:lt1>
+      <a:dk2>
+        <a:srgbClr val="158158"/>
+      </a:dk2>
+      <a:lt2>
+        <a:srgbClr val="F3F3F3"/>
+      </a:lt2>
+      <a:accent1>
+        <a:srgbClr val="058DC7"/>
+      </a:accent1>
+      <a:accent2>
+        <a:srgbClr val="50B432"/>
+      </a:accent2>
+      <a:accent3>
+        <a:srgbClr val="ED561B"/>
+      </a:accent3>
+      <a:accent4>
+        <a:srgbClr val="EDEF00"/>
+      </a:accent4>
+      <a:accent5>
+        <a:srgbClr val="24CBE5"/>
+      </a:accent5>
+      <a:accent6>
+        <a:srgbClr val="64E572"/>
+      </a:accent6>
+      <a:hlink>
+        <a:srgbClr val="2200CC"/>
+      </a:hlink>
+      <a:folHlink>
+        <a:srgbClr val="551A8B"/>
+      </a:folHlink>
+    </a:clrScheme>
+    <a:fontScheme name="Office">
+      <a:majorFont>
+        <a:latin typeface="Arial"/>
+        <a:ea typeface=""/>
+        <a:cs typeface=""/>
+        <a:font script="Jpan" typeface="ＭＳ Ｐゴシック"/>
+        <a:font script="Hang" typeface="맑은 고딕"/>
+        <a:font script="Hans" typeface="宋体"/>
+        <a:font script="Hant" typeface="新細明體"/>
+        <a:font script="Arab" typeface="Times New Roman"/>
+        <a:font script="Hebr" typeface="Times New Roman"/>
+        <a:font script="Thai" typeface="Angsana New"/>
+        <a:font script="Ethi" typeface="Nyala"/>
+        <a:font script="Beng" typeface="Vrinda"/>
+        <a:font script="Gujr" typeface="Shruti"/>
+        <a:font script="Khmr" typeface="MoolBoran"/>
+        <a:font script="Knda" typeface="Tunga"/>
+        <a:font script="Guru" typeface="Raavi"/>
+        <a:font script="Cans" typeface="Euphemia"/>
+        <a:font script="Cher" typeface="Plantagenet Cherokee"/>
+        <a:font script="Yiii" typeface="Microsoft Yi Baiti"/>
+        <a:font script="Tibt" typeface="Microsoft Himalaya"/>
+        <a:font script="Thaa" typeface="MV Boli"/>
+        <a:font script="Deva" typeface="Mangal"/>
+        <a:font script="Telu" typeface="Gautami"/>
+        <a:font script="Taml" typeface="Latha"/>
+        <a:font script="Syrc" typeface="Estrangelo Edessa"/>
+        <a:font script="Orya" typeface="Kalinga"/>
+        <a:font script="Mlym" typeface="Kartika"/>
+        <a:font script="Laoo" typeface="DokChampa"/>
+        <a:font script="Sinh" typeface="Iskoola Pota"/>
+        <a:font script="Mong" typeface="Mongolian Baiti"/>
+        <a:font script="Viet" typeface="Times New Roman"/>
+        <a:font script="Uigh" typeface="Microsoft Uighur"/>
+        <a:font script="Geor" typeface="Sylfaen"/>
+      </a:majorFont>
+      <a:minorFont>
+        <a:latin typeface="Arial"/>
+        <a:ea typeface=""/>
+        <a:cs typeface=""/>
+        <a:font script="Jpan" typeface="ＭＳ Ｐゴシック"/>
+        <a:font script="Hang" typeface="맑은 고딕"/>
+        <a:font script="Hans" typeface="宋体"/>
+        <a:font script="Hant" typeface="新細明體"/>
+        <a:font script="Arab" typeface="Arial"/>
+        <a:font script="Hebr" typeface="Arial"/>
+        <a:font script="Thai" typeface="Cordia New"/>
+        <a:font script="Ethi" typeface="Nyala"/>
+        <a:font script="Beng" typeface="Vrinda"/>
+        <a:font script="Gujr" typeface="Shruti"/>
+        <a:font script="Khmr" typeface="DaunPenh"/>
+        <a:font script="Knda" typeface="Tunga"/>
+        <a:font script="Guru" typeface="Raavi"/>
+        <a:font script="Cans" typeface="Euphemia"/>
+        <a:font script="Cher" typeface="Plantagenet Cherokee"/>
+        <a:font script="Yiii" typeface="Microsoft Yi Baiti"/>
+        <a:font script="Tibt" typeface="Microsoft Himalaya"/>
+        <a:font script="Thaa" typeface="MV Boli"/>
+        <a:font script="Deva" typeface="Mangal"/>
+        <a:font script="Telu" typeface="Gautami"/>
+        <a:font script="Taml" typeface="Latha"/>
+        <a:font script="Syrc" typeface="Estrangelo Edessa"/>
+        <a:font script="Orya" typeface="Kalinga"/>
+        <a:font script="Mlym" typeface="Kartika"/>
+        <a:font script="Laoo" typeface="DokChampa"/>
+        <a:font script="Sinh" typeface="Iskoola Pota"/>
+        <a:font script="Mong" typeface="Mongolian Baiti"/>
+        <a:font script="Viet" typeface="Arial"/>
+        <a:font script="Uigh" typeface="Microsoft Uighur"/>
+        <a:font script="Geor" typeface="Sylfaen"/>
+      </a:minorFont>
+    </a:fontScheme>
+    <a:fmtScheme name="Office">
+      <a:fillStyleLst>
+        <a:solidFill>
+          <a:schemeClr val="phClr"/>
+        </a:solidFill>
+        <a:gradFill rotWithShape="1">
+          <a:gsLst>
+            <a:gs pos="0">
+              <a:schemeClr val="phClr">
+                <a:tint val="50000"/>
+                <a:satMod val="300000"/>
+              </a:schemeClr>
+            </a:gs>
+            <a:gs pos="35000">
+              <a:schemeClr val="phClr">
+                <a:tint val="37000"/>
+                <a:satMod val="300000"/>
+              </a:schemeClr>
+            </a:gs>
+            <a:gs pos="100000">
+              <a:schemeClr val="phClr">
+                <a:tint val="15000"/>
+                <a:satMod val="350000"/>
+              </a:schemeClr>
+            </a:gs>
+          </a:gsLst>
+          <a:lin ang="16200000" scaled="1"/>
+        </a:gradFill>
+        <a:gradFill rotWithShape="1">
+          <a:gsLst>
+            <a:gs pos="0">
+              <a:schemeClr val="phClr">
+                <a:tint val="100000"/>
+                <a:shade val="100000"/>
+                <a:satMod val="130000"/>
+              </a:schemeClr>
+            </a:gs>
+            <a:gs pos="100000">
+              <a:schemeClr val="phClr">
+                <a:tint val="50000"/>
+                <a:shade val="100000"/>
+                <a:satMod val="350000"/>
+              </a:schemeClr>
+            </a:gs>
+          </a:gsLst>
+          <a:lin ang="16200000" scaled="0"/>
+        </a:gradFill>
+      </a:fillStyleLst>
+      <a:lnStyleLst>
+        <a:ln w="9525" cap="flat" cmpd="sng" algn="ctr">
+          <a:solidFill>
+            <a:schemeClr val="phClr">
+              <a:shade val="95000"/>
+              <a:satMod val="105000"/>
+            </a:schemeClr>
+          </a:solidFill>
+          <a:prstDash val="solid"/>
+        </a:ln>
+        <a:ln w="25400" cap="flat" cmpd="sng" algn="ctr">
+          <a:solidFill>
+            <a:schemeClr val="phClr"/>
+          </a:solidFill>
+          <a:prstDash val="solid"/>
+        </a:ln>
+        <a:ln w="38100" cap="flat" cmpd="sng" algn="ctr">
+          <a:solidFill>
+            <a:schemeClr val="phClr"/>
+          </a:solidFill>
+          <a:prstDash val="solid"/>
+        </a:ln>
+      </a:lnStyleLst>
+      <a:effectStyleLst>
+        <a:effectStyle>
+          <a:effectLst>
+            <a:outerShdw blurRad="40000" dist="20000" dir="5400000" rotWithShape="0">
+              <a:srgbClr val="000000">
+                <a:alpha val="38000"/>
+              </a:srgbClr>
+            </a:outerShdw>
+          </a:effectLst>
+        </a:effectStyle>
+        <a:effectStyle>
+          <a:effectLst>
+            <a:outerShdw blurRad="40000" dist="23000" dir="5400000" rotWithShape="0">
+              <a:srgbClr val="000000">
+                <a:alpha val="35000"/>
+              </a:srgbClr>
+            </a:outerShdw>
+          </a:effectLst>
+        </a:effectStyle>
+        <a:effectStyle>
+          <a:effectLst>
+            <a:outerShdw blurRad="40000" dist="23000" dir="5400000" rotWithShape="0">
+              <a:srgbClr val="000000">
+                <a:alpha val="35000"/>
+              </a:srgbClr>
+            </a:outerShdw>
+          </a:effectLst>
+          <a:scene3d>
+            <a:camera prst="orthographicFront">
+              <a:rot lat="0" lon="0" rev="0"/>
+            </a:camera>
+            <a:lightRig rig="threePt" dir="t">
+              <a:rot lat="0" lon="0" rev="1200000"/>
+            </a:lightRig>
+          </a:scene3d>
+          <a:sp3d>
+            <a:bevelT w="63500" h="25400"/>
+          </a:sp3d>
+        </a:effectStyle>
+      </a:effectStyleLst>
+      <a:bgFillStyleLst>
+        <a:solidFill>
+          <a:schemeClr val="phClr"/>
+        </a:solidFill>
+        <a:gradFill rotWithShape="1">
+          <a:gsLst>
+            <a:gs pos="0">
+              <a:schemeClr val="phClr">
+                <a:tint val="40000"/>
+                <a:satMod val="350000"/>
+              </a:schemeClr>
+            </a:gs>
+            <a:gs pos="40000">
+              <a:schemeClr val="phClr">
+                <a:tint val="45000"/>
+                <a:shade val="99000"/>
+                <a:satMod val="350000"/>
+              </a:schemeClr>
+            </a:gs>
+            <a:gs pos="100000">
+              <a:schemeClr val="phClr">
+                <a:shade val="20000"/>
+                <a:satMod val="255000"/>
+              </a:schemeClr>
+            </a:gs>
+          </a:gsLst>
+          <a:path path="circle">
+            <a:fillToRect l="50000" t="-80000" r="50000" b="180000"/>
+          </a:path>
+        </a:gradFill>
+        <a:gradFill rotWithShape="1">
+          <a:gsLst>
+            <a:gs pos="0">
+              <a:schemeClr val="phClr">
+                <a:tint val="80000"/>
+                <a:satMod val="300000"/>
+              </a:schemeClr>
+            </a:gs>
+            <a:gs pos="100000">
+              <a:schemeClr val="phClr">
+                <a:shade val="30000"/>
+                <a:satMod val="200000"/>
+              </a:schemeClr>
+            </a:gs>
+          </a:gsLst>
+          <a:path path="circle">
+            <a:fillToRect l="50000" t="50000" r="50000" b="50000"/>
+          </a:path>
+        </a:gradFill>
+      </a:bgFillStyleLst>
+    </a:fmtScheme>
+  </a:themeElements>
+</a:theme>
+</file>
+
+<file path=ppt/theme/theme2.xml><?xml version="1.0" encoding="utf-8"?>
 <a:theme xmlns:a="http://schemas.openxmlformats.org/drawingml/2006/main" xmlns:r="http://schemas.openxmlformats.org/officeDocument/2006/relationships" name="slate">
   <a:themeElements>
     <a:clrScheme name="Slate">
@@ -2498,283 +2807,4 @@
     </a:fmtScheme>
   </a:themeElements>
 </a:theme>
-</file>
-
-<file path=ppt/theme/theme2.xml><?xml version="1.0" encoding="utf-8"?>
-<a:theme xmlns:a="http://schemas.openxmlformats.org/drawingml/2006/main" xmlns:r="http://schemas.openxmlformats.org/officeDocument/2006/relationships" name="Custom Theme">
-  <a:themeElements>
-    <a:clrScheme name="Default">
-      <a:dk1>
-        <a:srgbClr val="000000"/>
-      </a:dk1>
-      <a:lt1>
-        <a:srgbClr val="FFFFFF"/>
-      </a:lt1>
-      <a:dk2>
-        <a:srgbClr val="158158"/>
-      </a:dk2>
-      <a:lt2>
-        <a:srgbClr val="F3F3F3"/>
-      </a:lt2>
-      <a:accent1>
-        <a:srgbClr val="058DC7"/>
-      </a:accent1>
-      <a:accent2>
-        <a:srgbClr val="50B432"/>
-      </a:accent2>
-      <a:accent3>
-        <a:srgbClr val="ED561B"/>
-      </a:accent3>
-      <a:accent4>
-        <a:srgbClr val="EDEF00"/>
-      </a:accent4>
-      <a:accent5>
-        <a:srgbClr val="24CBE5"/>
-      </a:accent5>
-      <a:accent6>
-        <a:srgbClr val="64E572"/>
-      </a:accent6>
-      <a:hlink>
-        <a:srgbClr val="2200CC"/>
-      </a:hlink>
-      <a:folHlink>
-        <a:srgbClr val="551A8B"/>
-      </a:folHlink>
-    </a:clrScheme>
-    <a:fontScheme name="Office">
-      <a:majorFont>
-        <a:latin typeface="Arial"/>
-        <a:ea typeface=""/>
-        <a:cs typeface=""/>
-        <a:font script="Jpan" typeface="ＭＳ Ｐゴシック"/>
-        <a:font script="Hang" typeface="맑은 고딕"/>
-        <a:font script="Hans" typeface="宋体"/>
-        <a:font script="Hant" typeface="新細明體"/>
-        <a:font script="Arab" typeface="Times New Roman"/>
-        <a:font script="Hebr" typeface="Times New Roman"/>
-        <a:font script="Thai" typeface="Angsana New"/>
-        <a:font script="Ethi" typeface="Nyala"/>
-        <a:font script="Beng" typeface="Vrinda"/>
-        <a:font script="Gujr" typeface="Shruti"/>
-        <a:font script="Khmr" typeface="MoolBoran"/>
-        <a:font script="Knda" typeface="Tunga"/>
-        <a:font script="Guru" typeface="Raavi"/>
-        <a:font script="Cans" typeface="Euphemia"/>
-        <a:font script="Cher" typeface="Plantagenet Cherokee"/>
-        <a:font script="Yiii" typeface="Microsoft Yi Baiti"/>
-        <a:font script="Tibt" typeface="Microsoft Himalaya"/>
-        <a:font script="Thaa" typeface="MV Boli"/>
-        <a:font script="Deva" typeface="Mangal"/>
-        <a:font script="Telu" typeface="Gautami"/>
-        <a:font script="Taml" typeface="Latha"/>
-        <a:font script="Syrc" typeface="Estrangelo Edessa"/>
-        <a:font script="Orya" typeface="Kalinga"/>
-        <a:font script="Mlym" typeface="Kartika"/>
-        <a:font script="Laoo" typeface="DokChampa"/>
-        <a:font script="Sinh" typeface="Iskoola Pota"/>
-        <a:font script="Mong" typeface="Mongolian Baiti"/>
-        <a:font script="Viet" typeface="Times New Roman"/>
-        <a:font script="Uigh" typeface="Microsoft Uighur"/>
-        <a:font script="Geor" typeface="Sylfaen"/>
-      </a:majorFont>
-      <a:minorFont>
-        <a:latin typeface="Arial"/>
-        <a:ea typeface=""/>
-        <a:cs typeface=""/>
-        <a:font script="Jpan" typeface="ＭＳ Ｐゴシック"/>
-        <a:font script="Hang" typeface="맑은 고딕"/>
-        <a:font script="Hans" typeface="宋体"/>
-        <a:font script="Hant" typeface="新細明體"/>
-        <a:font script="Arab" typeface="Arial"/>
-        <a:font script="Hebr" typeface="Arial"/>
-        <a:font script="Thai" typeface="Cordia New"/>
-        <a:font script="Ethi" typeface="Nyala"/>
-        <a:font script="Beng" typeface="Vrinda"/>
-        <a:font script="Gujr" typeface="Shruti"/>
-        <a:font script="Khmr" typeface="DaunPenh"/>
-        <a:font script="Knda" typeface="Tunga"/>
-        <a:font script="Guru" typeface="Raavi"/>
-        <a:font script="Cans" typeface="Euphemia"/>
-        <a:font script="Cher" typeface="Plantagenet Cherokee"/>
-        <a:font script="Yiii" typeface="Microsoft Yi Baiti"/>
-        <a:font script="Tibt" typeface="Microsoft Himalaya"/>
-        <a:font script="Thaa" typeface="MV Boli"/>
-        <a:font script="Deva" typeface="Mangal"/>
-        <a:font script="Telu" typeface="Gautami"/>
-        <a:font script="Taml" typeface="Latha"/>
-        <a:font script="Syrc" typeface="Estrangelo Edessa"/>
-        <a:font script="Orya" typeface="Kalinga"/>
-        <a:font script="Mlym" typeface="Kartika"/>
-        <a:font script="Laoo" typeface="DokChampa"/>
-        <a:font script="Sinh" typeface="Iskoola Pota"/>
-        <a:font script="Mong" typeface="Mongolian Baiti"/>
-        <a:font script="Viet" typeface="Arial"/>
-        <a:font script="Uigh" typeface="Microsoft Uighur"/>
-        <a:font script="Geor" typeface="Sylfaen"/>
-      </a:minorFont>
-    </a:fontScheme>
-    <a:fmtScheme name="Office">
-      <a:fillStyleLst>
-        <a:solidFill>
-          <a:schemeClr val="phClr"/>
-        </a:solidFill>
-        <a:gradFill rotWithShape="1">
-          <a:gsLst>
-            <a:gs pos="0">
-              <a:schemeClr val="phClr">
-                <a:tint val="50000"/>
-                <a:satMod val="300000"/>
-              </a:schemeClr>
-            </a:gs>
-            <a:gs pos="35000">
-              <a:schemeClr val="phClr">
-                <a:tint val="37000"/>
-                <a:satMod val="300000"/>
-              </a:schemeClr>
-            </a:gs>
-            <a:gs pos="100000">
-              <a:schemeClr val="phClr">
-                <a:tint val="15000"/>
-                <a:satMod val="350000"/>
-              </a:schemeClr>
-            </a:gs>
-          </a:gsLst>
-          <a:lin ang="16200000" scaled="1"/>
-        </a:gradFill>
-        <a:gradFill rotWithShape="1">
-          <a:gsLst>
-            <a:gs pos="0">
-              <a:schemeClr val="phClr">
-                <a:tint val="100000"/>
-                <a:shade val="100000"/>
-                <a:satMod val="130000"/>
-              </a:schemeClr>
-            </a:gs>
-            <a:gs pos="100000">
-              <a:schemeClr val="phClr">
-                <a:tint val="50000"/>
-                <a:shade val="100000"/>
-                <a:satMod val="350000"/>
-              </a:schemeClr>
-            </a:gs>
-          </a:gsLst>
-          <a:lin ang="16200000" scaled="0"/>
-        </a:gradFill>
-      </a:fillStyleLst>
-      <a:lnStyleLst>
-        <a:ln w="9525" cap="flat" cmpd="sng" algn="ctr">
-          <a:solidFill>
-            <a:schemeClr val="phClr">
-              <a:shade val="95000"/>
-              <a:satMod val="105000"/>
-            </a:schemeClr>
-          </a:solidFill>
-          <a:prstDash val="solid"/>
-        </a:ln>
-        <a:ln w="25400" cap="flat" cmpd="sng" algn="ctr">
-          <a:solidFill>
-            <a:schemeClr val="phClr"/>
-          </a:solidFill>
-          <a:prstDash val="solid"/>
-        </a:ln>
-        <a:ln w="38100" cap="flat" cmpd="sng" algn="ctr">
-          <a:solidFill>
-            <a:schemeClr val="phClr"/>
-          </a:solidFill>
-          <a:prstDash val="solid"/>
-        </a:ln>
-      </a:lnStyleLst>
-      <a:effectStyleLst>
-        <a:effectStyle>
-          <a:effectLst>
-            <a:outerShdw blurRad="40000" dist="20000" dir="5400000" rotWithShape="0">
-              <a:srgbClr val="000000">
-                <a:alpha val="38000"/>
-              </a:srgbClr>
-            </a:outerShdw>
-          </a:effectLst>
-        </a:effectStyle>
-        <a:effectStyle>
-          <a:effectLst>
-            <a:outerShdw blurRad="40000" dist="23000" dir="5400000" rotWithShape="0">
-              <a:srgbClr val="000000">
-                <a:alpha val="35000"/>
-              </a:srgbClr>
-            </a:outerShdw>
-          </a:effectLst>
-        </a:effectStyle>
-        <a:effectStyle>
-          <a:effectLst>
-            <a:outerShdw blurRad="40000" dist="23000" dir="5400000" rotWithShape="0">
-              <a:srgbClr val="000000">
-                <a:alpha val="35000"/>
-              </a:srgbClr>
-            </a:outerShdw>
-          </a:effectLst>
-          <a:scene3d>
-            <a:camera prst="orthographicFront">
-              <a:rot lat="0" lon="0" rev="0"/>
-            </a:camera>
-            <a:lightRig rig="threePt" dir="t">
-              <a:rot lat="0" lon="0" rev="1200000"/>
-            </a:lightRig>
-          </a:scene3d>
-          <a:sp3d>
-            <a:bevelT w="63500" h="25400"/>
-          </a:sp3d>
-        </a:effectStyle>
-      </a:effectStyleLst>
-      <a:bgFillStyleLst>
-        <a:solidFill>
-          <a:schemeClr val="phClr"/>
-        </a:solidFill>
-        <a:gradFill rotWithShape="1">
-          <a:gsLst>
-            <a:gs pos="0">
-              <a:schemeClr val="phClr">
-                <a:tint val="40000"/>
-                <a:satMod val="350000"/>
-              </a:schemeClr>
-            </a:gs>
-            <a:gs pos="40000">
-              <a:schemeClr val="phClr">
-                <a:tint val="45000"/>
-                <a:shade val="99000"/>
-                <a:satMod val="350000"/>
-              </a:schemeClr>
-            </a:gs>
-            <a:gs pos="100000">
-              <a:schemeClr val="phClr">
-                <a:shade val="20000"/>
-                <a:satMod val="255000"/>
-              </a:schemeClr>
-            </a:gs>
-          </a:gsLst>
-          <a:path path="circle">
-            <a:fillToRect l="50000" t="-80000" r="50000" b="180000"/>
-          </a:path>
-        </a:gradFill>
-        <a:gradFill rotWithShape="1">
-          <a:gsLst>
-            <a:gs pos="0">
-              <a:schemeClr val="phClr">
-                <a:tint val="80000"/>
-                <a:satMod val="300000"/>
-              </a:schemeClr>
-            </a:gs>
-            <a:gs pos="100000">
-              <a:schemeClr val="phClr">
-                <a:shade val="30000"/>
-                <a:satMod val="200000"/>
-              </a:schemeClr>
-            </a:gs>
-          </a:gsLst>
-          <a:path path="circle">
-            <a:fillToRect l="50000" t="50000" r="50000" b="50000"/>
-          </a:path>
-        </a:gradFill>
-      </a:bgFillStyleLst>
-    </a:fmtScheme>
-  </a:themeElements>
-</a:theme>
 </file>
</xml_diff>